<commit_message>
Exportação das colaborações corrigido e restringido a configuração inicial do sistema
</commit_message>
<xml_diff>
--- a/apresentação-do-sistema/apresentação-2-template-UFV.pptx
+++ b/apresentação-do-sistema/apresentação-2-template-UFV.pptx
@@ -252,7 +252,7 @@
           <a:p>
             <a:fld id="{BB1841B1-FF61-4F1F-BFA0-5CA5FED4888F}" type="datetimeFigureOut">
               <a:rPr lang="pt-BR" smtClean="0"/>
-              <a:t>10/03/2021</a:t>
+              <a:t>15/03/2021</a:t>
             </a:fld>
             <a:endParaRPr lang="pt-BR"/>
           </a:p>
@@ -430,7 +430,7 @@
           <a:p>
             <a:fld id="{7EABC3AC-69E9-4862-AF6F-34D082A2B44F}" type="datetimeFigureOut">
               <a:rPr lang="pt-BR" smtClean="0"/>
-              <a:t>10/03/2021</a:t>
+              <a:t>15/03/2021</a:t>
             </a:fld>
             <a:endParaRPr lang="pt-BR"/>
           </a:p>
@@ -827,7 +827,7 @@
           <a:p>
             <a:fld id="{94C06387-92F0-4C22-BB2A-42F418DD1A9F}" type="datetime1">
               <a:rPr lang="pt-BR" smtClean="0"/>
-              <a:t>10/03/2021</a:t>
+              <a:t>15/03/2021</a:t>
             </a:fld>
             <a:endParaRPr lang="pt-BR"/>
           </a:p>
@@ -995,7 +995,7 @@
           <a:p>
             <a:fld id="{D8C9E8FE-5271-4540-8F62-9276E0A45DFE}" type="datetime1">
               <a:rPr lang="pt-BR" smtClean="0"/>
-              <a:t>10/03/2021</a:t>
+              <a:t>15/03/2021</a:t>
             </a:fld>
             <a:endParaRPr lang="pt-BR"/>
           </a:p>
@@ -1173,7 +1173,7 @@
           <a:p>
             <a:fld id="{6F6B5472-9225-438F-9788-DBB41DC9C4C3}" type="datetime1">
               <a:rPr lang="pt-BR" smtClean="0"/>
-              <a:t>10/03/2021</a:t>
+              <a:t>15/03/2021</a:t>
             </a:fld>
             <a:endParaRPr lang="pt-BR"/>
           </a:p>
@@ -1268,7 +1268,7 @@
           <a:p>
             <a:fld id="{68BAAE51-8F00-4A62-89AF-86426231A2F5}" type="datetime1">
               <a:rPr lang="pt-BR" smtClean="0"/>
-              <a:t>10/03/2021</a:t>
+              <a:t>15/03/2021</a:t>
             </a:fld>
             <a:endParaRPr lang="pt-BR"/>
           </a:p>
@@ -1363,7 +1363,7 @@
           <a:p>
             <a:fld id="{881FC258-5B26-4C13-A7C2-F2F580A002DD}" type="datetime1">
               <a:rPr lang="pt-BR" smtClean="0"/>
-              <a:t>10/03/2021</a:t>
+              <a:t>15/03/2021</a:t>
             </a:fld>
             <a:endParaRPr lang="pt-BR"/>
           </a:p>
@@ -1531,7 +1531,7 @@
           <a:p>
             <a:fld id="{2081947D-9072-4240-AD14-81BF55B04726}" type="datetime1">
               <a:rPr lang="pt-BR" smtClean="0"/>
-              <a:t>10/03/2021</a:t>
+              <a:t>15/03/2021</a:t>
             </a:fld>
             <a:endParaRPr lang="pt-BR"/>
           </a:p>
@@ -1776,7 +1776,7 @@
           <a:p>
             <a:fld id="{081BBF53-2578-4AE7-906A-273E2E6DA380}" type="datetime1">
               <a:rPr lang="pt-BR" smtClean="0"/>
-              <a:t>10/03/2021</a:t>
+              <a:t>15/03/2021</a:t>
             </a:fld>
             <a:endParaRPr lang="pt-BR"/>
           </a:p>
@@ -2005,7 +2005,7 @@
           <a:p>
             <a:fld id="{7D3DC49D-7A78-41C7-9B98-AE66BE9B5BC5}" type="datetime1">
               <a:rPr lang="pt-BR" smtClean="0"/>
-              <a:t>10/03/2021</a:t>
+              <a:t>15/03/2021</a:t>
             </a:fld>
             <a:endParaRPr lang="pt-BR"/>
           </a:p>
@@ -2369,7 +2369,7 @@
           <a:p>
             <a:fld id="{B7C210A9-4501-4823-9A76-A0966720CAA4}" type="datetime1">
               <a:rPr lang="pt-BR" smtClean="0"/>
-              <a:t>10/03/2021</a:t>
+              <a:t>15/03/2021</a:t>
             </a:fld>
             <a:endParaRPr lang="pt-BR"/>
           </a:p>
@@ -2486,7 +2486,7 @@
           <a:p>
             <a:fld id="{D49878C2-31D2-49C8-97DF-1496A246E2F9}" type="datetime1">
               <a:rPr lang="pt-BR" smtClean="0"/>
-              <a:t>10/03/2021</a:t>
+              <a:t>15/03/2021</a:t>
             </a:fld>
             <a:endParaRPr lang="pt-BR"/>
           </a:p>
@@ -2581,7 +2581,7 @@
           <a:p>
             <a:fld id="{F954323E-182D-44E0-AF4C-BA83ACFACD03}" type="datetime1">
               <a:rPr lang="pt-BR" smtClean="0"/>
-              <a:t>10/03/2021</a:t>
+              <a:t>15/03/2021</a:t>
             </a:fld>
             <a:endParaRPr lang="pt-BR"/>
           </a:p>
@@ -2856,7 +2856,7 @@
           <a:p>
             <a:fld id="{9DF29E81-6B6D-429B-B11F-0C188431B3F2}" type="datetime1">
               <a:rPr lang="pt-BR" smtClean="0"/>
-              <a:t>10/03/2021</a:t>
+              <a:t>15/03/2021</a:t>
             </a:fld>
             <a:endParaRPr lang="pt-BR"/>
           </a:p>
@@ -3111,7 +3111,7 @@
           <a:p>
             <a:fld id="{CF1A0D1D-100A-431D-B4FD-237820B9DAAA}" type="datetime1">
               <a:rPr lang="pt-BR" smtClean="0"/>
-              <a:t>10/03/2021</a:t>
+              <a:t>15/03/2021</a:t>
             </a:fld>
             <a:endParaRPr lang="pt-BR"/>
           </a:p>
@@ -3331,7 +3331,7 @@
           <a:p>
             <a:fld id="{D23EEAD4-40F7-4D2C-A084-A943E0F33EBB}" type="datetime1">
               <a:rPr lang="pt-BR" smtClean="0"/>
-              <a:t>10/03/2021</a:t>
+              <a:t>15/03/2021</a:t>
             </a:fld>
             <a:endParaRPr lang="pt-BR"/>
           </a:p>
@@ -3786,7 +3786,7 @@
           <a:p>
             <a:fld id="{7CC2C951-9F12-46DC-A9EC-5AF0884967D4}" type="datetime1">
               <a:rPr lang="pt-BR" smtClean="0"/>
-              <a:t>10/03/2021</a:t>
+              <a:t>15/03/2021</a:t>
             </a:fld>
             <a:endParaRPr lang="pt-BR"/>
           </a:p>
@@ -4231,7 +4231,7 @@
           <a:p>
             <a:fld id="{CE51BA12-5BAB-4981-BDFC-002E5486A486}" type="datetime1">
               <a:rPr lang="pt-BR" smtClean="0"/>
-              <a:t>10/03/2021</a:t>
+              <a:t>15/03/2021</a:t>
             </a:fld>
             <a:endParaRPr lang="pt-BR"/>
           </a:p>
@@ -4652,11 +4652,11 @@
           <a:p>
             <a:r>
               <a:rPr lang="pt-BR" i="1" dirty="0"/>
-              <a:t>Um </a:t>
+              <a:t>Framework</a:t>
             </a:r>
             <a:r>
               <a:rPr lang="pt-BR" dirty="0"/>
-              <a:t>framework para desenvolvimento de sistemas VGI com base no </a:t>
+              <a:t> para desenvolvimento de sistemas VGI com base no </a:t>
             </a:r>
             <a:r>
               <a:rPr lang="pt-BR" dirty="0" err="1"/>

</xml_diff>